<commit_message>
fix test, update docs with bug numbers
</commit_message>
<xml_diff>
--- a/docs/Architecture_2018.pptx
+++ b/docs/Architecture_2018.pptx
@@ -288,7 +288,7 @@
           <a:p>
             <a:fld id="{57E13E19-9712-4C08-A35C-78B78B9B3BC2}" type="datetimeFigureOut">
               <a:rPr lang="en-CA" smtClean="0"/>
-              <a:t>2018-01-10</a:t>
+              <a:t>2018-06-04</a:t>
             </a:fld>
             <a:endParaRPr lang="en-CA"/>
           </a:p>
@@ -458,7 +458,7 @@
           <a:p>
             <a:fld id="{57E13E19-9712-4C08-A35C-78B78B9B3BC2}" type="datetimeFigureOut">
               <a:rPr lang="en-CA" smtClean="0"/>
-              <a:t>2018-01-10</a:t>
+              <a:t>2018-06-04</a:t>
             </a:fld>
             <a:endParaRPr lang="en-CA"/>
           </a:p>
@@ -638,7 +638,7 @@
           <a:p>
             <a:fld id="{57E13E19-9712-4C08-A35C-78B78B9B3BC2}" type="datetimeFigureOut">
               <a:rPr lang="en-CA" smtClean="0"/>
-              <a:t>2018-01-10</a:t>
+              <a:t>2018-06-04</a:t>
             </a:fld>
             <a:endParaRPr lang="en-CA"/>
           </a:p>
@@ -808,7 +808,7 @@
           <a:p>
             <a:fld id="{57E13E19-9712-4C08-A35C-78B78B9B3BC2}" type="datetimeFigureOut">
               <a:rPr lang="en-CA" smtClean="0"/>
-              <a:t>2018-01-10</a:t>
+              <a:t>2018-06-04</a:t>
             </a:fld>
             <a:endParaRPr lang="en-CA"/>
           </a:p>
@@ -1054,7 +1054,7 @@
           <a:p>
             <a:fld id="{57E13E19-9712-4C08-A35C-78B78B9B3BC2}" type="datetimeFigureOut">
               <a:rPr lang="en-CA" smtClean="0"/>
-              <a:t>2018-01-10</a:t>
+              <a:t>2018-06-04</a:t>
             </a:fld>
             <a:endParaRPr lang="en-CA"/>
           </a:p>
@@ -1342,7 +1342,7 @@
           <a:p>
             <a:fld id="{57E13E19-9712-4C08-A35C-78B78B9B3BC2}" type="datetimeFigureOut">
               <a:rPr lang="en-CA" smtClean="0"/>
-              <a:t>2018-01-10</a:t>
+              <a:t>2018-06-04</a:t>
             </a:fld>
             <a:endParaRPr lang="en-CA"/>
           </a:p>
@@ -1764,7 +1764,7 @@
           <a:p>
             <a:fld id="{57E13E19-9712-4C08-A35C-78B78B9B3BC2}" type="datetimeFigureOut">
               <a:rPr lang="en-CA" smtClean="0"/>
-              <a:t>2018-01-10</a:t>
+              <a:t>2018-06-04</a:t>
             </a:fld>
             <a:endParaRPr lang="en-CA"/>
           </a:p>
@@ -1882,7 +1882,7 @@
           <a:p>
             <a:fld id="{57E13E19-9712-4C08-A35C-78B78B9B3BC2}" type="datetimeFigureOut">
               <a:rPr lang="en-CA" smtClean="0"/>
-              <a:t>2018-01-10</a:t>
+              <a:t>2018-06-04</a:t>
             </a:fld>
             <a:endParaRPr lang="en-CA"/>
           </a:p>
@@ -1977,7 +1977,7 @@
           <a:p>
             <a:fld id="{57E13E19-9712-4C08-A35C-78B78B9B3BC2}" type="datetimeFigureOut">
               <a:rPr lang="en-CA" smtClean="0"/>
-              <a:t>2018-01-10</a:t>
+              <a:t>2018-06-04</a:t>
             </a:fld>
             <a:endParaRPr lang="en-CA"/>
           </a:p>
@@ -2254,7 +2254,7 @@
           <a:p>
             <a:fld id="{57E13E19-9712-4C08-A35C-78B78B9B3BC2}" type="datetimeFigureOut">
               <a:rPr lang="en-CA" smtClean="0"/>
-              <a:t>2018-01-10</a:t>
+              <a:t>2018-06-04</a:t>
             </a:fld>
             <a:endParaRPr lang="en-CA"/>
           </a:p>
@@ -2507,7 +2507,7 @@
           <a:p>
             <a:fld id="{57E13E19-9712-4C08-A35C-78B78B9B3BC2}" type="datetimeFigureOut">
               <a:rPr lang="en-CA" smtClean="0"/>
-              <a:t>2018-01-10</a:t>
+              <a:t>2018-06-04</a:t>
             </a:fld>
             <a:endParaRPr lang="en-CA"/>
           </a:p>
@@ -2720,7 +2720,7 @@
           <a:p>
             <a:fld id="{57E13E19-9712-4C08-A35C-78B78B9B3BC2}" type="datetimeFigureOut">
               <a:rPr lang="en-CA" smtClean="0"/>
-              <a:t>2018-01-10</a:t>
+              <a:t>2018-06-04</a:t>
             </a:fld>
             <a:endParaRPr lang="en-CA"/>
           </a:p>
@@ -3105,8 +3105,8 @@
         </p:nvSpPr>
         <p:spPr>
           <a:xfrm>
-            <a:off x="5994187" y="4095679"/>
-            <a:ext cx="1377141" cy="835592"/>
+            <a:off x="5994186" y="1674665"/>
+            <a:ext cx="1377141" cy="4060548"/>
           </a:xfrm>
           <a:prstGeom prst="roundRect">
             <a:avLst/>
@@ -3151,12 +3151,12 @@
               <a:t>VM </a:t>
             </a:r>
             <a:r>
-              <a:rPr lang="en-CA" sz="1200" b="1" dirty="0" smtClean="0">
+              <a:rPr lang="en-CA" sz="1200" b="1" dirty="0">
                 <a:solidFill>
                   <a:schemeClr val="tx1"/>
                 </a:solidFill>
               </a:rPr>
-              <a:t>(no bug yet)</a:t>
+              <a:t>(1466599)</a:t>
             </a:r>
             <a:endParaRPr lang="en-CA" sz="1200" b="1" dirty="0" smtClean="0">
               <a:solidFill>
@@ -3168,16 +3168,108 @@
       </p:sp>
       <p:sp>
         <p:nvSpPr>
-          <p:cNvPr id="50" name="Rounded Rectangle 49">
-            <a:hlinkClick r:id="rId2"/>
+          <p:cNvPr id="125" name="Rectangle 124"/>
+          <p:cNvSpPr/>
+          <p:nvPr/>
+        </p:nvSpPr>
+        <p:spPr>
+          <a:xfrm>
+            <a:off x="1737609" y="996881"/>
+            <a:ext cx="7370894" cy="5750661"/>
+          </a:xfrm>
+          <a:prstGeom prst="rect">
+            <a:avLst/>
+          </a:prstGeom>
+          <a:noFill/>
+          <a:ln w="53975">
+            <a:solidFill>
+              <a:srgbClr val="C00000"/>
+            </a:solidFill>
+          </a:ln>
+        </p:spPr>
+        <p:style>
+          <a:lnRef idx="2">
+            <a:schemeClr val="accent1">
+              <a:shade val="50000"/>
+            </a:schemeClr>
+          </a:lnRef>
+          <a:fillRef idx="1">
+            <a:schemeClr val="accent1"/>
+          </a:fillRef>
+          <a:effectRef idx="0">
+            <a:schemeClr val="accent1"/>
+          </a:effectRef>
+          <a:fontRef idx="minor">
+            <a:schemeClr val="lt1"/>
+          </a:fontRef>
+        </p:style>
+        <p:txBody>
+          <a:bodyPr rtlCol="0" anchor="ctr"/>
+          <a:lstStyle/>
+          <a:p>
+            <a:pPr algn="ctr"/>
+            <a:endParaRPr lang="en-CA"/>
+          </a:p>
+        </p:txBody>
+      </p:sp>
+      <p:sp>
+        <p:nvSpPr>
+          <p:cNvPr id="124" name="Rectangle 123"/>
+          <p:cNvSpPr/>
+          <p:nvPr/>
+        </p:nvSpPr>
+        <p:spPr>
+          <a:xfrm>
+            <a:off x="5724127" y="1208606"/>
+            <a:ext cx="3240360" cy="4748361"/>
+          </a:xfrm>
+          <a:prstGeom prst="rect">
+            <a:avLst/>
+          </a:prstGeom>
+          <a:noFill/>
+          <a:ln w="53975">
+            <a:solidFill>
+              <a:srgbClr val="7030A0"/>
+            </a:solidFill>
+          </a:ln>
+        </p:spPr>
+        <p:style>
+          <a:lnRef idx="2">
+            <a:schemeClr val="accent1">
+              <a:shade val="50000"/>
+            </a:schemeClr>
+          </a:lnRef>
+          <a:fillRef idx="1">
+            <a:schemeClr val="accent1"/>
+          </a:fillRef>
+          <a:effectRef idx="0">
+            <a:schemeClr val="accent1"/>
+          </a:effectRef>
+          <a:fontRef idx="minor">
+            <a:schemeClr val="lt1"/>
+          </a:fontRef>
+        </p:style>
+        <p:txBody>
+          <a:bodyPr rtlCol="0" anchor="ctr"/>
+          <a:lstStyle/>
+          <a:p>
+            <a:pPr algn="ctr"/>
+            <a:endParaRPr lang="en-CA"/>
+          </a:p>
+        </p:txBody>
+      </p:sp>
+      <p:sp>
+        <p:nvSpPr>
+          <p:cNvPr id="84" name="Rounded Rectangle 83">
+            <a:hlinkClick r:id="rId3"/>
           </p:cNvPr>
           <p:cNvSpPr/>
           <p:nvPr/>
         </p:nvSpPr>
         <p:spPr>
           <a:xfrm>
-            <a:off x="5974647" y="878396"/>
-            <a:ext cx="1377143" cy="846495"/>
+            <a:off x="3802922" y="1408192"/>
+            <a:ext cx="1493887" cy="1193376"/>
           </a:xfrm>
           <a:prstGeom prst="roundRect">
             <a:avLst/>
@@ -3219,7 +3311,7 @@
                   <a:schemeClr val="tx1"/>
                 </a:solidFill>
               </a:rPr>
-              <a:t>VM </a:t>
+              <a:t>Public ES Cluster (1344296</a:t>
             </a:r>
             <a:r>
               <a:rPr lang="en-CA" sz="1200" b="1" dirty="0">
@@ -3227,7 +3319,7 @@
                   <a:schemeClr val="tx1"/>
                 </a:solidFill>
               </a:rPr>
-              <a:t>(no bug yet)</a:t>
+              <a:t>)</a:t>
             </a:r>
             <a:endParaRPr lang="en-CA" sz="1200" b="1" dirty="0" smtClean="0">
               <a:solidFill>
@@ -3239,108 +3331,16 @@
       </p:sp>
       <p:sp>
         <p:nvSpPr>
-          <p:cNvPr id="125" name="Rectangle 124"/>
-          <p:cNvSpPr/>
-          <p:nvPr/>
-        </p:nvSpPr>
-        <p:spPr>
-          <a:xfrm>
-            <a:off x="1737610" y="192939"/>
-            <a:ext cx="7370894" cy="5750661"/>
-          </a:xfrm>
-          <a:prstGeom prst="rect">
-            <a:avLst/>
-          </a:prstGeom>
-          <a:noFill/>
-          <a:ln w="53975">
-            <a:solidFill>
-              <a:srgbClr val="C00000"/>
-            </a:solidFill>
-          </a:ln>
-        </p:spPr>
-        <p:style>
-          <a:lnRef idx="2">
-            <a:schemeClr val="accent1">
-              <a:shade val="50000"/>
-            </a:schemeClr>
-          </a:lnRef>
-          <a:fillRef idx="1">
-            <a:schemeClr val="accent1"/>
-          </a:fillRef>
-          <a:effectRef idx="0">
-            <a:schemeClr val="accent1"/>
-          </a:effectRef>
-          <a:fontRef idx="minor">
-            <a:schemeClr val="lt1"/>
-          </a:fontRef>
-        </p:style>
-        <p:txBody>
-          <a:bodyPr rtlCol="0" anchor="ctr"/>
-          <a:lstStyle/>
-          <a:p>
-            <a:pPr algn="ctr"/>
-            <a:endParaRPr lang="en-CA"/>
-          </a:p>
-        </p:txBody>
-      </p:sp>
-      <p:sp>
-        <p:nvSpPr>
-          <p:cNvPr id="124" name="Rectangle 123"/>
-          <p:cNvSpPr/>
-          <p:nvPr/>
-        </p:nvSpPr>
-        <p:spPr>
-          <a:xfrm>
-            <a:off x="5724128" y="404664"/>
-            <a:ext cx="3240360" cy="4748361"/>
-          </a:xfrm>
-          <a:prstGeom prst="rect">
-            <a:avLst/>
-          </a:prstGeom>
-          <a:noFill/>
-          <a:ln w="53975">
-            <a:solidFill>
-              <a:srgbClr val="7030A0"/>
-            </a:solidFill>
-          </a:ln>
-        </p:spPr>
-        <p:style>
-          <a:lnRef idx="2">
-            <a:schemeClr val="accent1">
-              <a:shade val="50000"/>
-            </a:schemeClr>
-          </a:lnRef>
-          <a:fillRef idx="1">
-            <a:schemeClr val="accent1"/>
-          </a:fillRef>
-          <a:effectRef idx="0">
-            <a:schemeClr val="accent1"/>
-          </a:effectRef>
-          <a:fontRef idx="minor">
-            <a:schemeClr val="lt1"/>
-          </a:fontRef>
-        </p:style>
-        <p:txBody>
-          <a:bodyPr rtlCol="0" anchor="ctr"/>
-          <a:lstStyle/>
-          <a:p>
-            <a:pPr algn="ctr"/>
-            <a:endParaRPr lang="en-CA"/>
-          </a:p>
-        </p:txBody>
-      </p:sp>
-      <p:sp>
-        <p:nvSpPr>
-          <p:cNvPr id="84" name="Rounded Rectangle 83">
-            <a:hlinkClick r:id="rId3"/>
+          <p:cNvPr id="76" name="Rounded Rectangle 75">
+            <a:hlinkClick r:id="rId4"/>
           </p:cNvPr>
           <p:cNvSpPr/>
           <p:nvPr/>
         </p:nvSpPr>
         <p:spPr>
           <a:xfrm>
-            <a:off x="3802923" y="604250"/>
-            <a:ext cx="1493887" cy="1193376"/>
+            <a:off x="2040033" y="1575841"/>
+            <a:ext cx="1318714" cy="1112319"/>
           </a:xfrm>
           <a:prstGeom prst="roundRect">
             <a:avLst/>
@@ -3377,83 +3377,12 @@
           <a:p>
             <a:pPr algn="ctr"/>
             <a:r>
-              <a:rPr lang="en-CA" sz="1200" b="1" dirty="0" smtClean="0">
-                <a:solidFill>
-                  <a:schemeClr val="tx1"/>
-                </a:solidFill>
-              </a:rPr>
-              <a:t>Public ES Cluster (1344296</a:t>
-            </a:r>
-            <a:r>
               <a:rPr lang="en-CA" sz="1200" b="1" dirty="0">
                 <a:solidFill>
                   <a:schemeClr val="tx1"/>
                 </a:solidFill>
               </a:rPr>
-              <a:t>)</a:t>
-            </a:r>
-            <a:endParaRPr lang="en-CA" sz="1200" b="1" dirty="0" smtClean="0">
-              <a:solidFill>
-                <a:schemeClr val="tx1"/>
-              </a:solidFill>
-            </a:endParaRPr>
-          </a:p>
-        </p:txBody>
-      </p:sp>
-      <p:sp>
-        <p:nvSpPr>
-          <p:cNvPr id="76" name="Rounded Rectangle 75">
-            <a:hlinkClick r:id="rId4"/>
-          </p:cNvPr>
-          <p:cNvSpPr/>
-          <p:nvPr/>
-        </p:nvSpPr>
-        <p:spPr>
-          <a:xfrm>
-            <a:off x="2040034" y="771899"/>
-            <a:ext cx="1318714" cy="1112319"/>
-          </a:xfrm>
-          <a:prstGeom prst="roundRect">
-            <a:avLst/>
-          </a:prstGeom>
-          <a:noFill/>
-          <a:ln>
-            <a:solidFill>
-              <a:schemeClr val="accent1">
-                <a:lumMod val="40000"/>
-                <a:lumOff val="60000"/>
-              </a:schemeClr>
-            </a:solidFill>
-          </a:ln>
-        </p:spPr>
-        <p:style>
-          <a:lnRef idx="2">
-            <a:schemeClr val="accent1">
-              <a:shade val="50000"/>
-            </a:schemeClr>
-          </a:lnRef>
-          <a:fillRef idx="1">
-            <a:schemeClr val="accent1"/>
-          </a:fillRef>
-          <a:effectRef idx="0">
-            <a:schemeClr val="accent1"/>
-          </a:effectRef>
-          <a:fontRef idx="minor">
-            <a:schemeClr val="lt1"/>
-          </a:fontRef>
-        </p:style>
-        <p:txBody>
-          <a:bodyPr rtlCol="0" anchor="b" anchorCtr="0"/>
-          <a:lstStyle/>
-          <a:p>
-            <a:pPr algn="ctr"/>
-            <a:r>
-              <a:rPr lang="en-CA" sz="1200" b="1" dirty="0">
-                <a:solidFill>
-                  <a:schemeClr val="tx1"/>
-                </a:solidFill>
-              </a:rPr>
-              <a:t>VM(no bug yet)</a:t>
+              <a:t>VM(1466584)</a:t>
             </a:r>
             <a:endParaRPr lang="en-CA" sz="1200" b="1" dirty="0" smtClean="0">
               <a:solidFill>
@@ -3471,7 +3400,7 @@
         </p:nvGrpSpPr>
         <p:grpSpPr>
           <a:xfrm>
-            <a:off x="4110141" y="3872212"/>
+            <a:off x="4110140" y="4676154"/>
             <a:ext cx="875038" cy="670402"/>
             <a:chOff x="1259632" y="4710257"/>
             <a:chExt cx="875038" cy="670402"/>
@@ -3576,7 +3505,7 @@
         </p:nvGrpSpPr>
         <p:grpSpPr>
           <a:xfrm>
-            <a:off x="4112350" y="682588"/>
+            <a:off x="4112349" y="1486530"/>
             <a:ext cx="875038" cy="670402"/>
             <a:chOff x="1944668" y="1262408"/>
             <a:chExt cx="875038" cy="670402"/>
@@ -3681,7 +3610,7 @@
         </p:nvGrpSpPr>
         <p:grpSpPr>
           <a:xfrm>
-            <a:off x="7740348" y="2137175"/>
+            <a:off x="7740347" y="2941117"/>
             <a:ext cx="1063365" cy="1283338"/>
             <a:chOff x="7740352" y="921525"/>
             <a:chExt cx="1063365" cy="1283338"/>
@@ -3762,7 +3691,7 @@
         </p:nvCxnSpPr>
         <p:spPr>
           <a:xfrm rot="10800000">
-            <a:off x="7131272" y="1200940"/>
+            <a:off x="7131271" y="2004882"/>
             <a:ext cx="609076" cy="1467918"/>
           </a:xfrm>
           <a:prstGeom prst="bentConnector3">
@@ -3801,7 +3730,7 @@
         </p:nvCxnSpPr>
         <p:spPr>
           <a:xfrm rot="10800000" flipV="1">
-            <a:off x="7150812" y="2668857"/>
+            <a:off x="7150811" y="3472799"/>
             <a:ext cx="589537" cy="1723353"/>
           </a:xfrm>
           <a:prstGeom prst="bentConnector3">
@@ -3839,7 +3768,7 @@
         </p:nvSpPr>
         <p:spPr>
           <a:xfrm>
-            <a:off x="6214706" y="4224823"/>
+            <a:off x="6214705" y="5028765"/>
             <a:ext cx="936105" cy="334776"/>
           </a:xfrm>
           <a:prstGeom prst="roundRect">
@@ -3908,8 +3837,29 @@
                   <a:schemeClr val="tx1"/>
                 </a:solidFill>
               </a:rPr>
-              <a:t>(no bug)</a:t>
-            </a:r>
+              <a:t>(</a:t>
+            </a:r>
+            <a:r>
+              <a:rPr lang="en-CA" sz="1200" b="1" dirty="0" smtClean="0">
+                <a:solidFill>
+                  <a:schemeClr val="tx1"/>
+                </a:solidFill>
+              </a:rPr>
+              <a:t>1466605</a:t>
+            </a:r>
+            <a:r>
+              <a:rPr lang="en-CA" sz="1200" b="1" dirty="0" smtClean="0">
+                <a:solidFill>
+                  <a:schemeClr val="tx1"/>
+                </a:solidFill>
+              </a:rPr>
+              <a:t>)</a:t>
+            </a:r>
+            <a:endParaRPr lang="en-CA" sz="1200" b="1" dirty="0">
+              <a:solidFill>
+                <a:schemeClr val="tx1"/>
+              </a:solidFill>
+            </a:endParaRPr>
           </a:p>
         </p:txBody>
       </p:sp>
@@ -3923,7 +3873,7 @@
         </p:nvCxnSpPr>
         <p:spPr>
           <a:xfrm rot="10800000" flipV="1">
-            <a:off x="5974649" y="1200939"/>
+            <a:off x="5974648" y="2004881"/>
             <a:ext cx="220518" cy="1"/>
           </a:xfrm>
           <a:prstGeom prst="bentConnector3">
@@ -3963,7 +3913,7 @@
         </p:nvSpPr>
         <p:spPr>
           <a:xfrm>
-            <a:off x="2150481" y="870723"/>
+            <a:off x="2150480" y="1674665"/>
             <a:ext cx="1097819" cy="660428"/>
           </a:xfrm>
           <a:prstGeom prst="roundRect">
@@ -4032,7 +3982,7 @@
                   <a:schemeClr val="tx1"/>
                 </a:solidFill>
               </a:rPr>
-              <a:t>(no bug yet)</a:t>
+              <a:t>(1466588)</a:t>
             </a:r>
             <a:endParaRPr lang="en-CA" sz="1200" b="1" dirty="0" smtClean="0">
               <a:solidFill>
@@ -4053,7 +4003,7 @@
         </p:nvCxnSpPr>
         <p:spPr>
           <a:xfrm rot="10800000">
-            <a:off x="3248301" y="1200938"/>
+            <a:off x="3248300" y="2004880"/>
             <a:ext cx="554623" cy="1"/>
           </a:xfrm>
           <a:prstGeom prst="bentConnector3">
@@ -4094,7 +4044,7 @@
         </p:nvSpPr>
         <p:spPr>
           <a:xfrm>
-            <a:off x="6195167" y="1033552"/>
+            <a:off x="6195166" y="1837494"/>
             <a:ext cx="936105" cy="334776"/>
           </a:xfrm>
           <a:prstGeom prst="roundRect">
@@ -4163,8 +4113,13 @@
                   <a:schemeClr val="tx1"/>
                 </a:solidFill>
               </a:rPr>
-              <a:t>(no bug)</a:t>
-            </a:r>
+              <a:t>(1466601)</a:t>
+            </a:r>
+            <a:endParaRPr lang="en-CA" sz="1200" b="1" dirty="0">
+              <a:solidFill>
+                <a:schemeClr val="tx1"/>
+              </a:solidFill>
+            </a:endParaRPr>
           </a:p>
         </p:txBody>
       </p:sp>
@@ -4176,7 +4131,7 @@
         </p:nvGrpSpPr>
         <p:grpSpPr>
           <a:xfrm>
-            <a:off x="197750" y="1110930"/>
+            <a:off x="197749" y="1914872"/>
             <a:ext cx="1311374" cy="1065290"/>
             <a:chOff x="3689433" y="4989465"/>
             <a:chExt cx="1619250" cy="1368266"/>
@@ -4254,7 +4209,7 @@
         </p:nvCxnSpPr>
         <p:spPr>
           <a:xfrm rot="10800000" flipV="1">
-            <a:off x="1509125" y="1200937"/>
+            <a:off x="1509124" y="2004879"/>
             <a:ext cx="641357" cy="442638"/>
           </a:xfrm>
           <a:prstGeom prst="bentConnector3">
@@ -4293,7 +4248,7 @@
         </p:nvSpPr>
         <p:spPr>
           <a:xfrm>
-            <a:off x="1737610" y="199673"/>
+            <a:off x="1737609" y="1003615"/>
             <a:ext cx="1592039" cy="276999"/>
           </a:xfrm>
           <a:prstGeom prst="rect">
@@ -4331,7 +4286,7 @@
         </p:nvSpPr>
         <p:spPr>
           <a:xfrm>
-            <a:off x="5724128" y="386611"/>
+            <a:off x="5724127" y="1190553"/>
             <a:ext cx="1699119" cy="276999"/>
           </a:xfrm>
           <a:prstGeom prst="rect">
@@ -4369,7 +4324,7 @@
         </p:nvCxnSpPr>
         <p:spPr>
           <a:xfrm rot="10800000" flipV="1">
-            <a:off x="5979326" y="4399394"/>
+            <a:off x="5979325" y="5203336"/>
             <a:ext cx="220518" cy="1"/>
           </a:xfrm>
           <a:prstGeom prst="bentConnector3">
@@ -4407,7 +4362,7 @@
         </p:nvSpPr>
         <p:spPr>
           <a:xfrm>
-            <a:off x="6564284" y="5255016"/>
+            <a:off x="6564283" y="6058958"/>
             <a:ext cx="2352134" cy="600164"/>
           </a:xfrm>
           <a:prstGeom prst="rect">
@@ -4444,7 +4399,7 @@
         </p:nvCxnSpPr>
         <p:spPr>
           <a:xfrm rot="5400000">
-            <a:off x="4103134" y="2194209"/>
+            <a:off x="4103133" y="2998151"/>
             <a:ext cx="843316" cy="50150"/>
           </a:xfrm>
           <a:prstGeom prst="bentConnector4">
@@ -4487,7 +4442,7 @@
         </p:nvCxnSpPr>
         <p:spPr>
           <a:xfrm rot="10800000">
-            <a:off x="5296811" y="1200938"/>
+            <a:off x="5296810" y="2004880"/>
             <a:ext cx="898357" cy="2"/>
           </a:xfrm>
           <a:prstGeom prst="bentConnector3">
@@ -4525,7 +4480,7 @@
         </p:nvGrpSpPr>
         <p:grpSpPr>
           <a:xfrm>
-            <a:off x="146847" y="3577573"/>
+            <a:off x="146846" y="4381515"/>
             <a:ext cx="1311377" cy="1065290"/>
             <a:chOff x="3689433" y="4989465"/>
             <a:chExt cx="1619252" cy="1368266"/>
@@ -4612,7 +4567,7 @@
         </p:nvSpPr>
         <p:spPr>
           <a:xfrm>
-            <a:off x="2007371" y="3974804"/>
+            <a:off x="2007370" y="4778746"/>
             <a:ext cx="1318714" cy="1102888"/>
           </a:xfrm>
           <a:prstGeom prst="roundRect">
@@ -4655,7 +4610,7 @@
                   <a:schemeClr val="tx1"/>
                 </a:solidFill>
               </a:rPr>
-              <a:t>VM(no bug yet)</a:t>
+              <a:t>VM(1466586)</a:t>
             </a:r>
             <a:endParaRPr lang="en-CA" sz="1200" b="1" dirty="0" smtClean="0">
               <a:solidFill>
@@ -4675,7 +4630,7 @@
         </p:nvSpPr>
         <p:spPr>
           <a:xfrm>
-            <a:off x="2115381" y="4060026"/>
+            <a:off x="2115380" y="4863968"/>
             <a:ext cx="1097820" cy="660428"/>
           </a:xfrm>
           <a:prstGeom prst="roundRect">
@@ -4744,7 +4699,7 @@
                   <a:schemeClr val="tx1"/>
                 </a:solidFill>
               </a:rPr>
-              <a:t>(no bug yet)</a:t>
+              <a:t>(1466589)</a:t>
             </a:r>
             <a:endParaRPr lang="en-CA" sz="1200" b="1" dirty="0" smtClean="0">
               <a:solidFill>
@@ -4765,7 +4720,7 @@
         </p:nvCxnSpPr>
         <p:spPr>
           <a:xfrm rot="10800000">
-            <a:off x="1458223" y="4110218"/>
+            <a:off x="1458222" y="4914160"/>
             <a:ext cx="657159" cy="280022"/>
           </a:xfrm>
           <a:prstGeom prst="bentConnector3">
@@ -4806,7 +4761,7 @@
         </p:nvSpPr>
         <p:spPr>
           <a:xfrm>
-            <a:off x="4013467" y="2256531"/>
+            <a:off x="4013466" y="3060473"/>
             <a:ext cx="1409589" cy="1067693"/>
           </a:xfrm>
           <a:prstGeom prst="roundRect">
@@ -4850,6 +4805,14 @@
                 </a:solidFill>
               </a:rPr>
               <a:t>Post-ETL Server</a:t>
+            </a:r>
+            <a:r>
+              <a:rPr lang="en-CA" sz="1200" b="1" dirty="0" smtClean="0">
+                <a:solidFill>
+                  <a:schemeClr val="tx1"/>
+                </a:solidFill>
+              </a:rPr>
+              <a:t/>
             </a:r>
             <a:br>
               <a:rPr lang="en-CA" sz="1200" b="1" dirty="0" smtClean="0">
@@ -4899,7 +4862,7 @@
         </p:blipFill>
         <p:spPr>
           <a:xfrm>
-            <a:off x="4499717" y="2397106"/>
+            <a:off x="4499716" y="3201048"/>
             <a:ext cx="487671" cy="487671"/>
           </a:xfrm>
           <a:prstGeom prst="rect">
@@ -4917,7 +4880,7 @@
         </p:nvSpPr>
         <p:spPr>
           <a:xfrm>
-            <a:off x="3833382" y="3778441"/>
+            <a:off x="3833381" y="4582383"/>
             <a:ext cx="1451806" cy="1224137"/>
           </a:xfrm>
           <a:prstGeom prst="roundRect">
@@ -5004,7 +4967,7 @@
         </p:nvCxnSpPr>
         <p:spPr>
           <a:xfrm rot="10800000">
-            <a:off x="3213202" y="4390240"/>
+            <a:off x="3213201" y="5194182"/>
             <a:ext cx="620181" cy="270"/>
           </a:xfrm>
           <a:prstGeom prst="bentConnector3">
@@ -5046,7 +5009,7 @@
         </p:nvCxnSpPr>
         <p:spPr>
           <a:xfrm rot="16200000" flipV="1">
-            <a:off x="3960752" y="3179908"/>
+            <a:off x="3960751" y="3983850"/>
             <a:ext cx="1137499" cy="59568"/>
           </a:xfrm>
           <a:prstGeom prst="bentConnector4">
@@ -5089,7 +5052,7 @@
         </p:nvCxnSpPr>
         <p:spPr>
           <a:xfrm rot="10800000">
-            <a:off x="5285188" y="4390511"/>
+            <a:off x="5285187" y="5194453"/>
             <a:ext cx="929518" cy="1701"/>
           </a:xfrm>
           <a:prstGeom prst="bentConnector3">
@@ -5129,7 +5092,7 @@
         </p:nvCxnSpPr>
         <p:spPr>
           <a:xfrm rot="10800000" flipV="1">
-            <a:off x="4112351" y="2640941"/>
+            <a:off x="4112350" y="3444883"/>
             <a:ext cx="387367" cy="3"/>
           </a:xfrm>
           <a:prstGeom prst="bentConnector3">
@@ -5159,6 +5122,41 @@
           </a:fontRef>
         </p:style>
       </p:cxnSp>
+      <p:sp>
+        <p:nvSpPr>
+          <p:cNvPr id="2" name="TextBox 1"/>
+          <p:cNvSpPr txBox="1"/>
+          <p:nvPr/>
+        </p:nvSpPr>
+        <p:spPr>
+          <a:xfrm>
+            <a:off x="565653" y="309808"/>
+            <a:ext cx="4947380" cy="369332"/>
+          </a:xfrm>
+          <a:prstGeom prst="rect">
+            <a:avLst/>
+          </a:prstGeom>
+          <a:noFill/>
+        </p:spPr>
+        <p:txBody>
+          <a:bodyPr wrap="none" rtlCol="0">
+            <a:spAutoFit/>
+          </a:bodyPr>
+          <a:lstStyle/>
+          <a:p>
+            <a:r>
+              <a:rPr lang="en-US" b="1" dirty="0">
+                <a:hlinkClick r:id="rId12"/>
+              </a:rPr>
+              <a:t>Bug 1429487</a:t>
+            </a:r>
+            <a:r>
+              <a:rPr lang="en-US" dirty="0"/>
+              <a:t> - [meta] Bugzilla-ETL upgrade to ESv6</a:t>
+            </a:r>
+          </a:p>
+        </p:txBody>
+      </p:sp>
     </p:spTree>
     <p:extLst>
       <p:ext uri="{BB962C8B-B14F-4D97-AF65-F5344CB8AC3E}">

</xml_diff>